<commit_message>
last corrections chapter 7
</commit_message>
<xml_diff>
--- a/slides/Discretization/SelfMadePlots.pptx
+++ b/slides/Discretization/SelfMadePlots.pptx
@@ -293,7 +293,7 @@
           <a:p>
             <a:fld id="{617150D6-FF34-A543-B36C-34FC9C27DCDE}" type="datetimeFigureOut">
               <a:rPr lang="nl-NL" smtClean="0"/>
-              <a:t>6/08/15</a:t>
+              <a:t>7/08/15</a:t>
             </a:fld>
             <a:endParaRPr lang="nl-NL"/>
           </a:p>
@@ -463,7 +463,7 @@
           <a:p>
             <a:fld id="{617150D6-FF34-A543-B36C-34FC9C27DCDE}" type="datetimeFigureOut">
               <a:rPr lang="nl-NL" smtClean="0"/>
-              <a:t>6/08/15</a:t>
+              <a:t>7/08/15</a:t>
             </a:fld>
             <a:endParaRPr lang="nl-NL"/>
           </a:p>
@@ -643,7 +643,7 @@
           <a:p>
             <a:fld id="{617150D6-FF34-A543-B36C-34FC9C27DCDE}" type="datetimeFigureOut">
               <a:rPr lang="nl-NL" smtClean="0"/>
-              <a:t>6/08/15</a:t>
+              <a:t>7/08/15</a:t>
             </a:fld>
             <a:endParaRPr lang="nl-NL"/>
           </a:p>
@@ -813,7 +813,7 @@
           <a:p>
             <a:fld id="{617150D6-FF34-A543-B36C-34FC9C27DCDE}" type="datetimeFigureOut">
               <a:rPr lang="nl-NL" smtClean="0"/>
-              <a:t>6/08/15</a:t>
+              <a:t>7/08/15</a:t>
             </a:fld>
             <a:endParaRPr lang="nl-NL"/>
           </a:p>
@@ -1059,7 +1059,7 @@
           <a:p>
             <a:fld id="{617150D6-FF34-A543-B36C-34FC9C27DCDE}" type="datetimeFigureOut">
               <a:rPr lang="nl-NL" smtClean="0"/>
-              <a:t>6/08/15</a:t>
+              <a:t>7/08/15</a:t>
             </a:fld>
             <a:endParaRPr lang="nl-NL"/>
           </a:p>
@@ -1347,7 +1347,7 @@
           <a:p>
             <a:fld id="{617150D6-FF34-A543-B36C-34FC9C27DCDE}" type="datetimeFigureOut">
               <a:rPr lang="nl-NL" smtClean="0"/>
-              <a:t>6/08/15</a:t>
+              <a:t>7/08/15</a:t>
             </a:fld>
             <a:endParaRPr lang="nl-NL"/>
           </a:p>
@@ -1769,7 +1769,7 @@
           <a:p>
             <a:fld id="{617150D6-FF34-A543-B36C-34FC9C27DCDE}" type="datetimeFigureOut">
               <a:rPr lang="nl-NL" smtClean="0"/>
-              <a:t>6/08/15</a:t>
+              <a:t>7/08/15</a:t>
             </a:fld>
             <a:endParaRPr lang="nl-NL"/>
           </a:p>
@@ -1887,7 +1887,7 @@
           <a:p>
             <a:fld id="{617150D6-FF34-A543-B36C-34FC9C27DCDE}" type="datetimeFigureOut">
               <a:rPr lang="nl-NL" smtClean="0"/>
-              <a:t>6/08/15</a:t>
+              <a:t>7/08/15</a:t>
             </a:fld>
             <a:endParaRPr lang="nl-NL"/>
           </a:p>
@@ -1982,7 +1982,7 @@
           <a:p>
             <a:fld id="{617150D6-FF34-A543-B36C-34FC9C27DCDE}" type="datetimeFigureOut">
               <a:rPr lang="nl-NL" smtClean="0"/>
-              <a:t>6/08/15</a:t>
+              <a:t>7/08/15</a:t>
             </a:fld>
             <a:endParaRPr lang="nl-NL"/>
           </a:p>
@@ -2259,7 +2259,7 @@
           <a:p>
             <a:fld id="{617150D6-FF34-A543-B36C-34FC9C27DCDE}" type="datetimeFigureOut">
               <a:rPr lang="nl-NL" smtClean="0"/>
-              <a:t>6/08/15</a:t>
+              <a:t>7/08/15</a:t>
             </a:fld>
             <a:endParaRPr lang="nl-NL"/>
           </a:p>
@@ -2512,7 +2512,7 @@
           <a:p>
             <a:fld id="{617150D6-FF34-A543-B36C-34FC9C27DCDE}" type="datetimeFigureOut">
               <a:rPr lang="nl-NL" smtClean="0"/>
-              <a:t>6/08/15</a:t>
+              <a:t>7/08/15</a:t>
             </a:fld>
             <a:endParaRPr lang="nl-NL"/>
           </a:p>
@@ -2725,7 +2725,7 @@
           <a:p>
             <a:fld id="{617150D6-FF34-A543-B36C-34FC9C27DCDE}" type="datetimeFigureOut">
               <a:rPr lang="nl-NL" smtClean="0"/>
-              <a:t>6/08/15</a:t>
+              <a:t>7/08/15</a:t>
             </a:fld>
             <a:endParaRPr lang="nl-NL"/>
           </a:p>
@@ -3102,7 +3102,7 @@
       </p:grpSpPr>
       <p:grpSp>
         <p:nvGrpSpPr>
-          <p:cNvPr id="46" name="Groeperen 45"/>
+          <p:cNvPr id="2" name="Groeperen 1"/>
           <p:cNvGrpSpPr/>
           <p:nvPr/>
         </p:nvGrpSpPr>
@@ -3114,195 +3114,35 @@
             <a:chExt cx="5549901" cy="657999"/>
           </a:xfrm>
         </p:grpSpPr>
-        <p:sp>
-          <p:nvSpPr>
-            <p:cNvPr id="4" name="Rechthoek 3"/>
-            <p:cNvSpPr/>
-            <p:nvPr/>
-          </p:nvSpPr>
-          <p:spPr>
-            <a:xfrm>
-              <a:off x="3308351" y="3152775"/>
-              <a:ext cx="717550" cy="434975"/>
-            </a:xfrm>
-            <a:prstGeom prst="rect">
-              <a:avLst/>
-            </a:prstGeom>
-            <a:noFill/>
-            <a:ln w="12700">
-              <a:solidFill>
-                <a:schemeClr val="tx1"/>
-              </a:solidFill>
-            </a:ln>
-            <a:effectLst/>
-          </p:spPr>
-          <p:style>
-            <a:lnRef idx="1">
-              <a:schemeClr val="accent1"/>
-            </a:lnRef>
-            <a:fillRef idx="3">
-              <a:schemeClr val="accent1"/>
-            </a:fillRef>
-            <a:effectRef idx="2">
-              <a:schemeClr val="accent1"/>
-            </a:effectRef>
-            <a:fontRef idx="minor">
-              <a:schemeClr val="lt1"/>
-            </a:fontRef>
-          </p:style>
-          <p:txBody>
-            <a:bodyPr rtlCol="0" anchor="ctr"/>
-            <a:lstStyle/>
-            <a:p>
-              <a:pPr algn="ctr"/>
-              <a:r>
-                <a:rPr lang="nl-NL" dirty="0" smtClean="0">
-                  <a:solidFill>
-                    <a:schemeClr val="tx1"/>
-                  </a:solidFill>
-                </a:rPr>
-                <a:t>H(s)</a:t>
-              </a:r>
-              <a:endParaRPr lang="nl-NL" dirty="0">
-                <a:solidFill>
-                  <a:schemeClr val="tx1"/>
-                </a:solidFill>
-              </a:endParaRPr>
-            </a:p>
-          </p:txBody>
-        </p:sp>
-        <p:sp>
-          <p:nvSpPr>
-            <p:cNvPr id="5" name="Rechthoek 4"/>
-            <p:cNvSpPr/>
-            <p:nvPr/>
-          </p:nvSpPr>
-          <p:spPr>
-            <a:xfrm>
-              <a:off x="5375276" y="3152775"/>
-              <a:ext cx="717550" cy="434975"/>
-            </a:xfrm>
-            <a:prstGeom prst="rect">
-              <a:avLst/>
-            </a:prstGeom>
-            <a:noFill/>
-            <a:ln w="12700">
-              <a:solidFill>
-                <a:schemeClr val="tx1"/>
-              </a:solidFill>
-            </a:ln>
-            <a:effectLst/>
-          </p:spPr>
-          <p:style>
-            <a:lnRef idx="1">
-              <a:schemeClr val="accent1"/>
-            </a:lnRef>
-            <a:fillRef idx="3">
-              <a:schemeClr val="accent1"/>
-            </a:fillRef>
-            <a:effectRef idx="2">
-              <a:schemeClr val="accent1"/>
-            </a:effectRef>
-            <a:fontRef idx="minor">
-              <a:schemeClr val="lt1"/>
-            </a:fontRef>
-          </p:style>
-          <p:txBody>
-            <a:bodyPr rtlCol="0" anchor="ctr"/>
-            <a:lstStyle/>
-            <a:p>
-              <a:pPr algn="ctr"/>
-              <a:r>
-                <a:rPr lang="nl-NL" dirty="0">
-                  <a:solidFill>
-                    <a:schemeClr val="tx1"/>
-                  </a:solidFill>
-                </a:rPr>
-                <a:t>G</a:t>
-              </a:r>
-              <a:r>
-                <a:rPr lang="nl-NL" dirty="0" smtClean="0">
-                  <a:solidFill>
-                    <a:schemeClr val="tx1"/>
-                  </a:solidFill>
-                </a:rPr>
-                <a:t>(s)</a:t>
-              </a:r>
-              <a:endParaRPr lang="nl-NL" dirty="0">
-                <a:solidFill>
-                  <a:schemeClr val="tx1"/>
-                </a:solidFill>
-              </a:endParaRPr>
-            </a:p>
-          </p:txBody>
-        </p:sp>
         <p:grpSp>
           <p:nvGrpSpPr>
-            <p:cNvPr id="23" name="Groeperen 22"/>
+            <p:cNvPr id="46" name="Groeperen 45"/>
             <p:cNvGrpSpPr/>
             <p:nvPr/>
           </p:nvGrpSpPr>
           <p:grpSpPr>
             <a:xfrm>
-              <a:off x="4025901" y="3127375"/>
-              <a:ext cx="1349375" cy="246065"/>
-              <a:chOff x="4025901" y="3127375"/>
-              <a:chExt cx="1349375" cy="246065"/>
+              <a:off x="1892300" y="3121837"/>
+              <a:ext cx="5549901" cy="657999"/>
+              <a:chOff x="1892300" y="3121837"/>
+              <a:chExt cx="5549901" cy="657999"/>
             </a:xfrm>
           </p:grpSpPr>
-          <p:cxnSp>
-            <p:nvCxnSpPr>
-              <p:cNvPr id="9" name="Rechte verbindingslijn met pijl 8"/>
-              <p:cNvCxnSpPr>
-                <a:endCxn id="5" idx="1"/>
-              </p:cNvCxnSpPr>
+          <p:sp>
+            <p:nvSpPr>
+              <p:cNvPr id="4" name="Rechthoek 3"/>
+              <p:cNvSpPr/>
               <p:nvPr/>
-            </p:nvCxnSpPr>
+            </p:nvSpPr>
             <p:spPr>
               <a:xfrm>
-                <a:off x="4962525" y="3370263"/>
-                <a:ext cx="412751" cy="0"/>
+                <a:off x="3308351" y="3152775"/>
+                <a:ext cx="717550" cy="434975"/>
               </a:xfrm>
-              <a:prstGeom prst="straightConnector1">
+              <a:prstGeom prst="rect">
                 <a:avLst/>
               </a:prstGeom>
-              <a:ln w="12700">
-                <a:solidFill>
-                  <a:schemeClr val="tx1"/>
-                </a:solidFill>
-                <a:tailEnd type="triangle" w="med" len="med"/>
-              </a:ln>
-              <a:effectLst/>
-            </p:spPr>
-            <p:style>
-              <a:lnRef idx="2">
-                <a:schemeClr val="accent1"/>
-              </a:lnRef>
-              <a:fillRef idx="0">
-                <a:schemeClr val="accent1"/>
-              </a:fillRef>
-              <a:effectRef idx="1">
-                <a:schemeClr val="accent1"/>
-              </a:effectRef>
-              <a:fontRef idx="minor">
-                <a:schemeClr val="tx1"/>
-              </a:fontRef>
-            </p:style>
-          </p:cxnSp>
-          <p:cxnSp>
-            <p:nvCxnSpPr>
-              <p:cNvPr id="11" name="Rechte verbindingslijn 10"/>
-              <p:cNvCxnSpPr/>
-              <p:nvPr/>
-            </p:nvCxnSpPr>
-            <p:spPr>
-              <a:xfrm flipV="1">
-                <a:off x="4025901" y="3370263"/>
-                <a:ext cx="431999" cy="0"/>
-              </a:xfrm>
-              <a:prstGeom prst="line">
-                <a:avLst/>
-              </a:prstGeom>
+              <a:noFill/>
               <a:ln w="12700">
                 <a:solidFill>
                   <a:schemeClr val="tx1"/>
@@ -3311,34 +3151,55 @@
               <a:effectLst/>
             </p:spPr>
             <p:style>
-              <a:lnRef idx="2">
+              <a:lnRef idx="1">
                 <a:schemeClr val="accent1"/>
               </a:lnRef>
-              <a:fillRef idx="0">
+              <a:fillRef idx="3">
                 <a:schemeClr val="accent1"/>
               </a:fillRef>
-              <a:effectRef idx="1">
+              <a:effectRef idx="2">
                 <a:schemeClr val="accent1"/>
               </a:effectRef>
               <a:fontRef idx="minor">
-                <a:schemeClr val="tx1"/>
+                <a:schemeClr val="lt1"/>
               </a:fontRef>
             </p:style>
-          </p:cxnSp>
-          <p:cxnSp>
-            <p:nvCxnSpPr>
-              <p:cNvPr id="17" name="Rechte verbindingslijn 16"/>
-              <p:cNvCxnSpPr/>
+            <p:txBody>
+              <a:bodyPr rtlCol="0" anchor="ctr"/>
+              <a:lstStyle/>
+              <a:p>
+                <a:pPr algn="ctr"/>
+                <a:r>
+                  <a:rPr lang="nl-NL" dirty="0" smtClean="0">
+                    <a:solidFill>
+                      <a:schemeClr val="tx1"/>
+                    </a:solidFill>
+                  </a:rPr>
+                  <a:t>H(s)</a:t>
+                </a:r>
+                <a:endParaRPr lang="nl-NL" dirty="0">
+                  <a:solidFill>
+                    <a:schemeClr val="tx1"/>
+                  </a:solidFill>
+                </a:endParaRPr>
+              </a:p>
+            </p:txBody>
+          </p:sp>
+          <p:sp>
+            <p:nvSpPr>
+              <p:cNvPr id="5" name="Rechthoek 4"/>
+              <p:cNvSpPr/>
               <p:nvPr/>
-            </p:nvCxnSpPr>
+            </p:nvSpPr>
             <p:spPr>
-              <a:xfrm flipV="1">
-                <a:off x="4451550" y="3127375"/>
-                <a:ext cx="418900" cy="246065"/>
+              <a:xfrm>
+                <a:off x="5375276" y="3152775"/>
+                <a:ext cx="717550" cy="434975"/>
               </a:xfrm>
-              <a:prstGeom prst="line">
+              <a:prstGeom prst="rect">
                 <a:avLst/>
               </a:prstGeom>
+              <a:noFill/>
               <a:ln w="12700">
                 <a:solidFill>
                   <a:schemeClr val="tx1"/>
@@ -3347,401 +3208,874 @@
               <a:effectLst/>
             </p:spPr>
             <p:style>
-              <a:lnRef idx="2">
+              <a:lnRef idx="1">
                 <a:schemeClr val="accent1"/>
               </a:lnRef>
-              <a:fillRef idx="0">
+              <a:fillRef idx="3">
                 <a:schemeClr val="accent1"/>
               </a:fillRef>
-              <a:effectRef idx="1">
+              <a:effectRef idx="2">
                 <a:schemeClr val="accent1"/>
               </a:effectRef>
               <a:fontRef idx="minor">
-                <a:schemeClr val="tx1"/>
+                <a:schemeClr val="lt1"/>
               </a:fontRef>
             </p:style>
-          </p:cxnSp>
-        </p:grpSp>
-        <p:grpSp>
-          <p:nvGrpSpPr>
-            <p:cNvPr id="24" name="Groeperen 23"/>
-            <p:cNvGrpSpPr/>
-            <p:nvPr/>
-          </p:nvGrpSpPr>
-          <p:grpSpPr>
-            <a:xfrm>
-              <a:off x="1958976" y="3124198"/>
-              <a:ext cx="1349375" cy="246065"/>
-              <a:chOff x="4025901" y="3127375"/>
-              <a:chExt cx="1349375" cy="246065"/>
-            </a:xfrm>
-          </p:grpSpPr>
-          <p:cxnSp>
-            <p:nvCxnSpPr>
-              <p:cNvPr id="25" name="Rechte verbindingslijn met pijl 24"/>
-              <p:cNvCxnSpPr/>
+            <p:txBody>
+              <a:bodyPr rtlCol="0" anchor="ctr"/>
+              <a:lstStyle/>
+              <a:p>
+                <a:pPr algn="ctr"/>
+                <a:r>
+                  <a:rPr lang="nl-NL" dirty="0">
+                    <a:solidFill>
+                      <a:schemeClr val="tx1"/>
+                    </a:solidFill>
+                  </a:rPr>
+                  <a:t>G</a:t>
+                </a:r>
+                <a:r>
+                  <a:rPr lang="nl-NL" dirty="0" smtClean="0">
+                    <a:solidFill>
+                      <a:schemeClr val="tx1"/>
+                    </a:solidFill>
+                  </a:rPr>
+                  <a:t>(s)</a:t>
+                </a:r>
+                <a:endParaRPr lang="nl-NL" dirty="0">
+                  <a:solidFill>
+                    <a:schemeClr val="tx1"/>
+                  </a:solidFill>
+                </a:endParaRPr>
+              </a:p>
+            </p:txBody>
+          </p:sp>
+          <p:grpSp>
+            <p:nvGrpSpPr>
+              <p:cNvPr id="23" name="Groeperen 22"/>
+              <p:cNvGrpSpPr/>
               <p:nvPr/>
-            </p:nvCxnSpPr>
+            </p:nvGrpSpPr>
+            <p:grpSpPr>
+              <a:xfrm>
+                <a:off x="4025901" y="3127375"/>
+                <a:ext cx="1349375" cy="246065"/>
+                <a:chOff x="4025901" y="3127375"/>
+                <a:chExt cx="1349375" cy="246065"/>
+              </a:xfrm>
+            </p:grpSpPr>
+            <p:cxnSp>
+              <p:nvCxnSpPr>
+                <p:cNvPr id="9" name="Rechte verbindingslijn met pijl 8"/>
+                <p:cNvCxnSpPr>
+                  <a:endCxn id="5" idx="1"/>
+                </p:cNvCxnSpPr>
+                <p:nvPr/>
+              </p:nvCxnSpPr>
+              <p:spPr>
+                <a:xfrm>
+                  <a:off x="4962525" y="3370263"/>
+                  <a:ext cx="412751" cy="0"/>
+                </a:xfrm>
+                <a:prstGeom prst="straightConnector1">
+                  <a:avLst/>
+                </a:prstGeom>
+                <a:ln w="12700">
+                  <a:solidFill>
+                    <a:schemeClr val="tx1"/>
+                  </a:solidFill>
+                  <a:tailEnd type="triangle" w="med" len="med"/>
+                </a:ln>
+                <a:effectLst/>
+              </p:spPr>
+              <p:style>
+                <a:lnRef idx="2">
+                  <a:schemeClr val="accent1"/>
+                </a:lnRef>
+                <a:fillRef idx="0">
+                  <a:schemeClr val="accent1"/>
+                </a:fillRef>
+                <a:effectRef idx="1">
+                  <a:schemeClr val="accent1"/>
+                </a:effectRef>
+                <a:fontRef idx="minor">
+                  <a:schemeClr val="tx1"/>
+                </a:fontRef>
+              </p:style>
+            </p:cxnSp>
+            <p:cxnSp>
+              <p:nvCxnSpPr>
+                <p:cNvPr id="11" name="Rechte verbindingslijn 10"/>
+                <p:cNvCxnSpPr/>
+                <p:nvPr/>
+              </p:nvCxnSpPr>
+              <p:spPr>
+                <a:xfrm flipV="1">
+                  <a:off x="4025901" y="3370263"/>
+                  <a:ext cx="431999" cy="0"/>
+                </a:xfrm>
+                <a:prstGeom prst="line">
+                  <a:avLst/>
+                </a:prstGeom>
+                <a:ln w="12700">
+                  <a:solidFill>
+                    <a:schemeClr val="tx1"/>
+                  </a:solidFill>
+                </a:ln>
+                <a:effectLst/>
+              </p:spPr>
+              <p:style>
+                <a:lnRef idx="2">
+                  <a:schemeClr val="accent1"/>
+                </a:lnRef>
+                <a:fillRef idx="0">
+                  <a:schemeClr val="accent1"/>
+                </a:fillRef>
+                <a:effectRef idx="1">
+                  <a:schemeClr val="accent1"/>
+                </a:effectRef>
+                <a:fontRef idx="minor">
+                  <a:schemeClr val="tx1"/>
+                </a:fontRef>
+              </p:style>
+            </p:cxnSp>
+            <p:cxnSp>
+              <p:nvCxnSpPr>
+                <p:cNvPr id="17" name="Rechte verbindingslijn 16"/>
+                <p:cNvCxnSpPr/>
+                <p:nvPr/>
+              </p:nvCxnSpPr>
+              <p:spPr>
+                <a:xfrm flipV="1">
+                  <a:off x="4451550" y="3127375"/>
+                  <a:ext cx="418900" cy="246065"/>
+                </a:xfrm>
+                <a:prstGeom prst="line">
+                  <a:avLst/>
+                </a:prstGeom>
+                <a:ln w="12700">
+                  <a:solidFill>
+                    <a:schemeClr val="tx1"/>
+                  </a:solidFill>
+                </a:ln>
+                <a:effectLst/>
+              </p:spPr>
+              <p:style>
+                <a:lnRef idx="2">
+                  <a:schemeClr val="accent1"/>
+                </a:lnRef>
+                <a:fillRef idx="0">
+                  <a:schemeClr val="accent1"/>
+                </a:fillRef>
+                <a:effectRef idx="1">
+                  <a:schemeClr val="accent1"/>
+                </a:effectRef>
+                <a:fontRef idx="minor">
+                  <a:schemeClr val="tx1"/>
+                </a:fontRef>
+              </p:style>
+            </p:cxnSp>
+          </p:grpSp>
+          <p:grpSp>
+            <p:nvGrpSpPr>
+              <p:cNvPr id="24" name="Groeperen 23"/>
+              <p:cNvGrpSpPr/>
+              <p:nvPr/>
+            </p:nvGrpSpPr>
+            <p:grpSpPr>
+              <a:xfrm>
+                <a:off x="1958976" y="3124198"/>
+                <a:ext cx="1349375" cy="246065"/>
+                <a:chOff x="4025901" y="3127375"/>
+                <a:chExt cx="1349375" cy="246065"/>
+              </a:xfrm>
+            </p:grpSpPr>
+            <p:cxnSp>
+              <p:nvCxnSpPr>
+                <p:cNvPr id="25" name="Rechte verbindingslijn met pijl 24"/>
+                <p:cNvCxnSpPr/>
+                <p:nvPr/>
+              </p:nvCxnSpPr>
+              <p:spPr>
+                <a:xfrm>
+                  <a:off x="4962525" y="3370263"/>
+                  <a:ext cx="412751" cy="0"/>
+                </a:xfrm>
+                <a:prstGeom prst="straightConnector1">
+                  <a:avLst/>
+                </a:prstGeom>
+                <a:ln w="12700">
+                  <a:solidFill>
+                    <a:schemeClr val="tx1"/>
+                  </a:solidFill>
+                  <a:tailEnd type="triangle" w="med" len="med"/>
+                </a:ln>
+                <a:effectLst/>
+              </p:spPr>
+              <p:style>
+                <a:lnRef idx="2">
+                  <a:schemeClr val="accent1"/>
+                </a:lnRef>
+                <a:fillRef idx="0">
+                  <a:schemeClr val="accent1"/>
+                </a:fillRef>
+                <a:effectRef idx="1">
+                  <a:schemeClr val="accent1"/>
+                </a:effectRef>
+                <a:fontRef idx="minor">
+                  <a:schemeClr val="tx1"/>
+                </a:fontRef>
+              </p:style>
+            </p:cxnSp>
+            <p:cxnSp>
+              <p:nvCxnSpPr>
+                <p:cNvPr id="26" name="Rechte verbindingslijn 25"/>
+                <p:cNvCxnSpPr/>
+                <p:nvPr/>
+              </p:nvCxnSpPr>
+              <p:spPr>
+                <a:xfrm flipV="1">
+                  <a:off x="4025901" y="3370263"/>
+                  <a:ext cx="431999" cy="0"/>
+                </a:xfrm>
+                <a:prstGeom prst="line">
+                  <a:avLst/>
+                </a:prstGeom>
+                <a:ln w="12700">
+                  <a:solidFill>
+                    <a:schemeClr val="tx1"/>
+                  </a:solidFill>
+                </a:ln>
+                <a:effectLst/>
+              </p:spPr>
+              <p:style>
+                <a:lnRef idx="2">
+                  <a:schemeClr val="accent1"/>
+                </a:lnRef>
+                <a:fillRef idx="0">
+                  <a:schemeClr val="accent1"/>
+                </a:fillRef>
+                <a:effectRef idx="1">
+                  <a:schemeClr val="accent1"/>
+                </a:effectRef>
+                <a:fontRef idx="minor">
+                  <a:schemeClr val="tx1"/>
+                </a:fontRef>
+              </p:style>
+            </p:cxnSp>
+            <p:cxnSp>
+              <p:nvCxnSpPr>
+                <p:cNvPr id="27" name="Rechte verbindingslijn 26"/>
+                <p:cNvCxnSpPr/>
+                <p:nvPr/>
+              </p:nvCxnSpPr>
+              <p:spPr>
+                <a:xfrm flipV="1">
+                  <a:off x="4451550" y="3127375"/>
+                  <a:ext cx="418900" cy="246065"/>
+                </a:xfrm>
+                <a:prstGeom prst="line">
+                  <a:avLst/>
+                </a:prstGeom>
+                <a:ln w="12700">
+                  <a:solidFill>
+                    <a:schemeClr val="tx1"/>
+                  </a:solidFill>
+                </a:ln>
+                <a:effectLst/>
+              </p:spPr>
+              <p:style>
+                <a:lnRef idx="2">
+                  <a:schemeClr val="accent1"/>
+                </a:lnRef>
+                <a:fillRef idx="0">
+                  <a:schemeClr val="accent1"/>
+                </a:fillRef>
+                <a:effectRef idx="1">
+                  <a:schemeClr val="accent1"/>
+                </a:effectRef>
+                <a:fontRef idx="minor">
+                  <a:schemeClr val="tx1"/>
+                </a:fontRef>
+              </p:style>
+            </p:cxnSp>
+          </p:grpSp>
+          <p:grpSp>
+            <p:nvGrpSpPr>
+              <p:cNvPr id="28" name="Groeperen 27"/>
+              <p:cNvGrpSpPr/>
+              <p:nvPr/>
+            </p:nvGrpSpPr>
+            <p:grpSpPr>
+              <a:xfrm>
+                <a:off x="6092826" y="3124198"/>
+                <a:ext cx="1349375" cy="246065"/>
+                <a:chOff x="4025901" y="3127375"/>
+                <a:chExt cx="1349375" cy="246065"/>
+              </a:xfrm>
+            </p:grpSpPr>
+            <p:cxnSp>
+              <p:nvCxnSpPr>
+                <p:cNvPr id="29" name="Rechte verbindingslijn met pijl 28"/>
+                <p:cNvCxnSpPr/>
+                <p:nvPr/>
+              </p:nvCxnSpPr>
+              <p:spPr>
+                <a:xfrm>
+                  <a:off x="4962525" y="3370263"/>
+                  <a:ext cx="412751" cy="0"/>
+                </a:xfrm>
+                <a:prstGeom prst="straightConnector1">
+                  <a:avLst/>
+                </a:prstGeom>
+                <a:ln w="12700">
+                  <a:solidFill>
+                    <a:schemeClr val="tx1"/>
+                  </a:solidFill>
+                  <a:tailEnd type="oval" w="sm" len="sm"/>
+                </a:ln>
+                <a:effectLst/>
+              </p:spPr>
+              <p:style>
+                <a:lnRef idx="2">
+                  <a:schemeClr val="accent1"/>
+                </a:lnRef>
+                <a:fillRef idx="0">
+                  <a:schemeClr val="accent1"/>
+                </a:fillRef>
+                <a:effectRef idx="1">
+                  <a:schemeClr val="accent1"/>
+                </a:effectRef>
+                <a:fontRef idx="minor">
+                  <a:schemeClr val="tx1"/>
+                </a:fontRef>
+              </p:style>
+            </p:cxnSp>
+            <p:cxnSp>
+              <p:nvCxnSpPr>
+                <p:cNvPr id="30" name="Rechte verbindingslijn 29"/>
+                <p:cNvCxnSpPr/>
+                <p:nvPr/>
+              </p:nvCxnSpPr>
+              <p:spPr>
+                <a:xfrm flipV="1">
+                  <a:off x="4025901" y="3370263"/>
+                  <a:ext cx="431999" cy="0"/>
+                </a:xfrm>
+                <a:prstGeom prst="line">
+                  <a:avLst/>
+                </a:prstGeom>
+                <a:ln w="12700">
+                  <a:solidFill>
+                    <a:schemeClr val="tx1"/>
+                  </a:solidFill>
+                </a:ln>
+                <a:effectLst/>
+              </p:spPr>
+              <p:style>
+                <a:lnRef idx="2">
+                  <a:schemeClr val="accent1"/>
+                </a:lnRef>
+                <a:fillRef idx="0">
+                  <a:schemeClr val="accent1"/>
+                </a:fillRef>
+                <a:effectRef idx="1">
+                  <a:schemeClr val="accent1"/>
+                </a:effectRef>
+                <a:fontRef idx="minor">
+                  <a:schemeClr val="tx1"/>
+                </a:fontRef>
+              </p:style>
+            </p:cxnSp>
+            <p:cxnSp>
+              <p:nvCxnSpPr>
+                <p:cNvPr id="31" name="Rechte verbindingslijn 30"/>
+                <p:cNvCxnSpPr/>
+                <p:nvPr/>
+              </p:nvCxnSpPr>
+              <p:spPr>
+                <a:xfrm flipV="1">
+                  <a:off x="4451550" y="3127375"/>
+                  <a:ext cx="418900" cy="246065"/>
+                </a:xfrm>
+                <a:prstGeom prst="line">
+                  <a:avLst/>
+                </a:prstGeom>
+                <a:ln w="12700">
+                  <a:solidFill>
+                    <a:schemeClr val="tx1"/>
+                  </a:solidFill>
+                </a:ln>
+                <a:effectLst/>
+              </p:spPr>
+              <p:style>
+                <a:lnRef idx="2">
+                  <a:schemeClr val="accent1"/>
+                </a:lnRef>
+                <a:fillRef idx="0">
+                  <a:schemeClr val="accent1"/>
+                </a:fillRef>
+                <a:effectRef idx="1">
+                  <a:schemeClr val="accent1"/>
+                </a:effectRef>
+                <a:fontRef idx="minor">
+                  <a:schemeClr val="tx1"/>
+                </a:fontRef>
+              </p:style>
+            </p:cxnSp>
+          </p:grpSp>
+          <p:sp>
+            <p:nvSpPr>
+              <p:cNvPr id="32" name="Tekstvak 31"/>
+              <p:cNvSpPr txBox="1"/>
+              <p:nvPr/>
+            </p:nvSpPr>
             <p:spPr>
               <a:xfrm>
-                <a:off x="4962525" y="3370263"/>
-                <a:ext cx="412751" cy="0"/>
+                <a:off x="1892300" y="3121837"/>
+                <a:ext cx="152400" cy="276999"/>
               </a:xfrm>
-              <a:prstGeom prst="straightConnector1">
+              <a:prstGeom prst="rect">
                 <a:avLst/>
               </a:prstGeom>
-              <a:ln w="12700">
-                <a:solidFill>
-                  <a:schemeClr val="tx1"/>
-                </a:solidFill>
-                <a:tailEnd type="triangle" w="med" len="med"/>
-              </a:ln>
-              <a:effectLst/>
+              <a:noFill/>
             </p:spPr>
-            <p:style>
-              <a:lnRef idx="2">
-                <a:schemeClr val="accent1"/>
-              </a:lnRef>
-              <a:fillRef idx="0">
-                <a:schemeClr val="accent1"/>
-              </a:fillRef>
-              <a:effectRef idx="1">
-                <a:schemeClr val="accent1"/>
-              </a:effectRef>
-              <a:fontRef idx="minor">
-                <a:schemeClr val="tx1"/>
-              </a:fontRef>
-            </p:style>
-          </p:cxnSp>
-          <p:cxnSp>
-            <p:nvCxnSpPr>
-              <p:cNvPr id="26" name="Rechte verbindingslijn 25"/>
-              <p:cNvCxnSpPr/>
+            <p:txBody>
+              <a:bodyPr wrap="square" rtlCol="0">
+                <a:spAutoFit/>
+              </a:bodyPr>
+              <a:lstStyle/>
+              <a:p>
+                <a:r>
+                  <a:rPr lang="nl-NL" sz="1200" dirty="0"/>
+                  <a:t>r</a:t>
+                </a:r>
+              </a:p>
+            </p:txBody>
+          </p:sp>
+          <p:sp>
+            <p:nvSpPr>
+              <p:cNvPr id="33" name="Tekstvak 32"/>
+              <p:cNvSpPr txBox="1"/>
               <p:nvPr/>
-            </p:nvCxnSpPr>
+            </p:nvSpPr>
             <p:spPr>
-              <a:xfrm flipV="1">
-                <a:off x="4025901" y="3370263"/>
-                <a:ext cx="431999" cy="0"/>
+              <a:xfrm>
+                <a:off x="2844800" y="3121837"/>
+                <a:ext cx="152400" cy="276999"/>
               </a:xfrm>
-              <a:prstGeom prst="line">
+              <a:prstGeom prst="rect">
                 <a:avLst/>
               </a:prstGeom>
-              <a:ln w="12700">
-                <a:solidFill>
-                  <a:schemeClr val="tx1"/>
-                </a:solidFill>
-              </a:ln>
-              <a:effectLst/>
+              <a:noFill/>
             </p:spPr>
-            <p:style>
-              <a:lnRef idx="2">
-                <a:schemeClr val="accent1"/>
-              </a:lnRef>
-              <a:fillRef idx="0">
-                <a:schemeClr val="accent1"/>
-              </a:fillRef>
-              <a:effectRef idx="1">
-                <a:schemeClr val="accent1"/>
-              </a:effectRef>
-              <a:fontRef idx="minor">
-                <a:schemeClr val="tx1"/>
-              </a:fontRef>
-            </p:style>
-          </p:cxnSp>
-          <p:cxnSp>
-            <p:nvCxnSpPr>
-              <p:cNvPr id="27" name="Rechte verbindingslijn 26"/>
-              <p:cNvCxnSpPr/>
+            <p:txBody>
+              <a:bodyPr wrap="square" rtlCol="0">
+                <a:spAutoFit/>
+              </a:bodyPr>
+              <a:lstStyle/>
+              <a:p>
+                <a:r>
+                  <a:rPr lang="nl-NL" sz="1200" dirty="0"/>
+                  <a:t>r</a:t>
+                </a:r>
+                <a:r>
+                  <a:rPr lang="nl-NL" sz="1200" dirty="0" smtClean="0"/>
+                  <a:t>*</a:t>
+                </a:r>
+                <a:endParaRPr lang="nl-NL" sz="1200" dirty="0"/>
+              </a:p>
+            </p:txBody>
+          </p:sp>
+          <p:sp>
+            <p:nvSpPr>
+              <p:cNvPr id="34" name="Tekstvak 33"/>
+              <p:cNvSpPr txBox="1"/>
               <p:nvPr/>
-            </p:nvCxnSpPr>
+            </p:nvSpPr>
             <p:spPr>
-              <a:xfrm flipV="1">
-                <a:off x="4451550" y="3127375"/>
-                <a:ext cx="418900" cy="246065"/>
+              <a:xfrm>
+                <a:off x="1892300" y="3502837"/>
+                <a:ext cx="152400" cy="276999"/>
               </a:xfrm>
-              <a:prstGeom prst="line">
+              <a:prstGeom prst="rect">
                 <a:avLst/>
               </a:prstGeom>
-              <a:ln w="12700">
-                <a:solidFill>
-                  <a:schemeClr val="tx1"/>
-                </a:solidFill>
-              </a:ln>
-              <a:effectLst/>
+              <a:noFill/>
             </p:spPr>
-            <p:style>
-              <a:lnRef idx="2">
-                <a:schemeClr val="accent1"/>
-              </a:lnRef>
-              <a:fillRef idx="0">
-                <a:schemeClr val="accent1"/>
-              </a:fillRef>
-              <a:effectRef idx="1">
-                <a:schemeClr val="accent1"/>
-              </a:effectRef>
-              <a:fontRef idx="minor">
-                <a:schemeClr val="tx1"/>
-              </a:fontRef>
-            </p:style>
-          </p:cxnSp>
-        </p:grpSp>
-        <p:grpSp>
-          <p:nvGrpSpPr>
-            <p:cNvPr id="28" name="Groeperen 27"/>
-            <p:cNvGrpSpPr/>
-            <p:nvPr/>
-          </p:nvGrpSpPr>
-          <p:grpSpPr>
-            <a:xfrm>
-              <a:off x="6092826" y="3124198"/>
-              <a:ext cx="1349375" cy="246065"/>
-              <a:chOff x="4025901" y="3127375"/>
-              <a:chExt cx="1349375" cy="246065"/>
-            </a:xfrm>
-          </p:grpSpPr>
-          <p:cxnSp>
-            <p:nvCxnSpPr>
-              <p:cNvPr id="29" name="Rechte verbindingslijn met pijl 28"/>
-              <p:cNvCxnSpPr/>
+            <p:txBody>
+              <a:bodyPr wrap="square" rtlCol="0">
+                <a:spAutoFit/>
+              </a:bodyPr>
+              <a:lstStyle/>
+              <a:p>
+                <a:r>
+                  <a:rPr lang="nl-NL" sz="1200" dirty="0" smtClean="0"/>
+                  <a:t>R(s)</a:t>
+                </a:r>
+                <a:endParaRPr lang="nl-NL" sz="1200" dirty="0"/>
+              </a:p>
+            </p:txBody>
+          </p:sp>
+          <p:sp>
+            <p:nvSpPr>
+              <p:cNvPr id="35" name="Tekstvak 34"/>
+              <p:cNvSpPr txBox="1"/>
               <p:nvPr/>
-            </p:nvCxnSpPr>
+            </p:nvSpPr>
             <p:spPr>
               <a:xfrm>
-                <a:off x="4962525" y="3370263"/>
-                <a:ext cx="412751" cy="0"/>
+                <a:off x="2844800" y="3502837"/>
+                <a:ext cx="152400" cy="276999"/>
               </a:xfrm>
-              <a:prstGeom prst="straightConnector1">
+              <a:prstGeom prst="rect">
                 <a:avLst/>
               </a:prstGeom>
-              <a:ln w="12700">
-                <a:solidFill>
-                  <a:schemeClr val="tx1"/>
-                </a:solidFill>
-                <a:tailEnd type="oval" w="sm" len="sm"/>
-              </a:ln>
-              <a:effectLst/>
+              <a:noFill/>
             </p:spPr>
-            <p:style>
-              <a:lnRef idx="2">
-                <a:schemeClr val="accent1"/>
-              </a:lnRef>
-              <a:fillRef idx="0">
-                <a:schemeClr val="accent1"/>
-              </a:fillRef>
-              <a:effectRef idx="1">
-                <a:schemeClr val="accent1"/>
-              </a:effectRef>
-              <a:fontRef idx="minor">
-                <a:schemeClr val="tx1"/>
-              </a:fontRef>
-            </p:style>
-          </p:cxnSp>
-          <p:cxnSp>
-            <p:nvCxnSpPr>
-              <p:cNvPr id="30" name="Rechte verbindingslijn 29"/>
-              <p:cNvCxnSpPr/>
+            <p:txBody>
+              <a:bodyPr wrap="square" rtlCol="0">
+                <a:spAutoFit/>
+              </a:bodyPr>
+              <a:lstStyle/>
+              <a:p>
+                <a:r>
+                  <a:rPr lang="nl-NL" sz="1200" dirty="0" smtClean="0"/>
+                  <a:t>R*(s)</a:t>
+                </a:r>
+                <a:endParaRPr lang="nl-NL" sz="1200" dirty="0"/>
+              </a:p>
+            </p:txBody>
+          </p:sp>
+          <p:sp>
+            <p:nvSpPr>
+              <p:cNvPr id="36" name="Tekstvak 35"/>
+              <p:cNvSpPr txBox="1"/>
               <p:nvPr/>
-            </p:nvCxnSpPr>
+            </p:nvSpPr>
             <p:spPr>
-              <a:xfrm flipV="1">
-                <a:off x="4025901" y="3370263"/>
-                <a:ext cx="431999" cy="0"/>
+              <a:xfrm>
+                <a:off x="2517775" y="3310751"/>
+                <a:ext cx="152400" cy="276999"/>
               </a:xfrm>
-              <a:prstGeom prst="line">
+              <a:prstGeom prst="rect">
                 <a:avLst/>
               </a:prstGeom>
-              <a:ln w="12700">
-                <a:solidFill>
-                  <a:schemeClr val="tx1"/>
-                </a:solidFill>
-              </a:ln>
-              <a:effectLst/>
+              <a:noFill/>
             </p:spPr>
-            <p:style>
-              <a:lnRef idx="2">
-                <a:schemeClr val="accent1"/>
-              </a:lnRef>
-              <a:fillRef idx="0">
-                <a:schemeClr val="accent1"/>
-              </a:fillRef>
-              <a:effectRef idx="1">
-                <a:schemeClr val="accent1"/>
-              </a:effectRef>
-              <a:fontRef idx="minor">
-                <a:schemeClr val="tx1"/>
-              </a:fontRef>
-            </p:style>
-          </p:cxnSp>
-          <p:cxnSp>
-            <p:nvCxnSpPr>
-              <p:cNvPr id="31" name="Rechte verbindingslijn 30"/>
-              <p:cNvCxnSpPr/>
+            <p:txBody>
+              <a:bodyPr wrap="square" rtlCol="0">
+                <a:spAutoFit/>
+              </a:bodyPr>
+              <a:lstStyle/>
+              <a:p>
+                <a:r>
+                  <a:rPr lang="nl-NL" sz="1200" dirty="0" smtClean="0"/>
+                  <a:t>T</a:t>
+                </a:r>
+                <a:r>
+                  <a:rPr lang="nl-NL" sz="1200" baseline="-25000" dirty="0" smtClean="0"/>
+                  <a:t>s</a:t>
+                </a:r>
+                <a:endParaRPr lang="nl-NL" sz="1200" baseline="-25000" dirty="0"/>
+              </a:p>
+            </p:txBody>
+          </p:sp>
+          <p:sp>
+            <p:nvSpPr>
+              <p:cNvPr id="37" name="Tekstvak 36"/>
+              <p:cNvSpPr txBox="1"/>
               <p:nvPr/>
-            </p:nvCxnSpPr>
+            </p:nvSpPr>
             <p:spPr>
-              <a:xfrm flipV="1">
-                <a:off x="4451550" y="3127375"/>
-                <a:ext cx="418900" cy="246065"/>
+              <a:xfrm>
+                <a:off x="4038600" y="3121837"/>
+                <a:ext cx="152400" cy="276999"/>
               </a:xfrm>
-              <a:prstGeom prst="line">
+              <a:prstGeom prst="rect">
                 <a:avLst/>
               </a:prstGeom>
-              <a:ln w="12700">
-                <a:solidFill>
-                  <a:schemeClr val="tx1"/>
-                </a:solidFill>
-              </a:ln>
-              <a:effectLst/>
+              <a:noFill/>
             </p:spPr>
-            <p:style>
-              <a:lnRef idx="2">
-                <a:schemeClr val="accent1"/>
-              </a:lnRef>
-              <a:fillRef idx="0">
-                <a:schemeClr val="accent1"/>
-              </a:fillRef>
-              <a:effectRef idx="1">
-                <a:schemeClr val="accent1"/>
-              </a:effectRef>
-              <a:fontRef idx="minor">
-                <a:schemeClr val="tx1"/>
-              </a:fontRef>
-            </p:style>
-          </p:cxnSp>
+            <p:txBody>
+              <a:bodyPr wrap="square" rtlCol="0">
+                <a:spAutoFit/>
+              </a:bodyPr>
+              <a:lstStyle/>
+              <a:p>
+                <a:r>
+                  <a:rPr lang="nl-NL" sz="1200" dirty="0" smtClean="0"/>
+                  <a:t>e</a:t>
+                </a:r>
+                <a:endParaRPr lang="nl-NL" sz="1200" dirty="0"/>
+              </a:p>
+            </p:txBody>
+          </p:sp>
+          <p:sp>
+            <p:nvSpPr>
+              <p:cNvPr id="38" name="Tekstvak 37"/>
+              <p:cNvSpPr txBox="1"/>
+              <p:nvPr/>
+            </p:nvSpPr>
+            <p:spPr>
+              <a:xfrm>
+                <a:off x="4930775" y="3121837"/>
+                <a:ext cx="152400" cy="276999"/>
+              </a:xfrm>
+              <a:prstGeom prst="rect">
+                <a:avLst/>
+              </a:prstGeom>
+              <a:noFill/>
+            </p:spPr>
+            <p:txBody>
+              <a:bodyPr wrap="square" rtlCol="0">
+                <a:spAutoFit/>
+              </a:bodyPr>
+              <a:lstStyle/>
+              <a:p>
+                <a:r>
+                  <a:rPr lang="nl-NL" sz="1200" dirty="0" smtClean="0"/>
+                  <a:t>e*</a:t>
+                </a:r>
+                <a:endParaRPr lang="nl-NL" sz="1200" dirty="0"/>
+              </a:p>
+            </p:txBody>
+          </p:sp>
+          <p:sp>
+            <p:nvSpPr>
+              <p:cNvPr id="39" name="Tekstvak 38"/>
+              <p:cNvSpPr txBox="1"/>
+              <p:nvPr/>
+            </p:nvSpPr>
+            <p:spPr>
+              <a:xfrm>
+                <a:off x="4038600" y="3502837"/>
+                <a:ext cx="152400" cy="276999"/>
+              </a:xfrm>
+              <a:prstGeom prst="rect">
+                <a:avLst/>
+              </a:prstGeom>
+              <a:noFill/>
+            </p:spPr>
+            <p:txBody>
+              <a:bodyPr wrap="square" rtlCol="0">
+                <a:spAutoFit/>
+              </a:bodyPr>
+              <a:lstStyle/>
+              <a:p>
+                <a:r>
+                  <a:rPr lang="nl-NL" sz="1200" dirty="0" smtClean="0"/>
+                  <a:t>E(s)</a:t>
+                </a:r>
+                <a:endParaRPr lang="nl-NL" sz="1200" dirty="0"/>
+              </a:p>
+            </p:txBody>
+          </p:sp>
+          <p:sp>
+            <p:nvSpPr>
+              <p:cNvPr id="40" name="Tekstvak 39"/>
+              <p:cNvSpPr txBox="1"/>
+              <p:nvPr/>
+            </p:nvSpPr>
+            <p:spPr>
+              <a:xfrm>
+                <a:off x="4930775" y="3502837"/>
+                <a:ext cx="152400" cy="276999"/>
+              </a:xfrm>
+              <a:prstGeom prst="rect">
+                <a:avLst/>
+              </a:prstGeom>
+              <a:noFill/>
+            </p:spPr>
+            <p:txBody>
+              <a:bodyPr wrap="square" rtlCol="0">
+                <a:spAutoFit/>
+              </a:bodyPr>
+              <a:lstStyle/>
+              <a:p>
+                <a:r>
+                  <a:rPr lang="nl-NL" sz="1200" dirty="0"/>
+                  <a:t>E</a:t>
+                </a:r>
+                <a:r>
+                  <a:rPr lang="nl-NL" sz="1200" dirty="0" smtClean="0"/>
+                  <a:t>*(s)</a:t>
+                </a:r>
+                <a:endParaRPr lang="nl-NL" sz="1200" dirty="0"/>
+              </a:p>
+            </p:txBody>
+          </p:sp>
+          <p:sp>
+            <p:nvSpPr>
+              <p:cNvPr id="41" name="Tekstvak 40"/>
+              <p:cNvSpPr txBox="1"/>
+              <p:nvPr/>
+            </p:nvSpPr>
+            <p:spPr>
+              <a:xfrm>
+                <a:off x="4594225" y="3310751"/>
+                <a:ext cx="152400" cy="276999"/>
+              </a:xfrm>
+              <a:prstGeom prst="rect">
+                <a:avLst/>
+              </a:prstGeom>
+              <a:noFill/>
+            </p:spPr>
+            <p:txBody>
+              <a:bodyPr wrap="square" rtlCol="0">
+                <a:spAutoFit/>
+              </a:bodyPr>
+              <a:lstStyle/>
+              <a:p>
+                <a:r>
+                  <a:rPr lang="nl-NL" sz="1200" dirty="0" smtClean="0"/>
+                  <a:t>T</a:t>
+                </a:r>
+                <a:r>
+                  <a:rPr lang="nl-NL" sz="1200" baseline="-25000" dirty="0" smtClean="0"/>
+                  <a:t>s</a:t>
+                </a:r>
+                <a:endParaRPr lang="nl-NL" sz="1200" baseline="-25000" dirty="0"/>
+              </a:p>
+            </p:txBody>
+          </p:sp>
+          <p:sp>
+            <p:nvSpPr>
+              <p:cNvPr id="42" name="Tekstvak 41"/>
+              <p:cNvSpPr txBox="1"/>
+              <p:nvPr/>
+            </p:nvSpPr>
+            <p:spPr>
+              <a:xfrm>
+                <a:off x="6118225" y="3121837"/>
+                <a:ext cx="152400" cy="276999"/>
+              </a:xfrm>
+              <a:prstGeom prst="rect">
+                <a:avLst/>
+              </a:prstGeom>
+              <a:noFill/>
+            </p:spPr>
+            <p:txBody>
+              <a:bodyPr wrap="square" rtlCol="0">
+                <a:spAutoFit/>
+              </a:bodyPr>
+              <a:lstStyle/>
+              <a:p>
+                <a:r>
+                  <a:rPr lang="nl-NL" sz="1200" dirty="0"/>
+                  <a:t>u</a:t>
+                </a:r>
+              </a:p>
+            </p:txBody>
+          </p:sp>
+          <p:sp>
+            <p:nvSpPr>
+              <p:cNvPr id="43" name="Tekstvak 42"/>
+              <p:cNvSpPr txBox="1"/>
+              <p:nvPr/>
+            </p:nvSpPr>
+            <p:spPr>
+              <a:xfrm>
+                <a:off x="7013575" y="3121837"/>
+                <a:ext cx="152400" cy="276999"/>
+              </a:xfrm>
+              <a:prstGeom prst="rect">
+                <a:avLst/>
+              </a:prstGeom>
+              <a:noFill/>
+            </p:spPr>
+            <p:txBody>
+              <a:bodyPr wrap="square" rtlCol="0">
+                <a:spAutoFit/>
+              </a:bodyPr>
+              <a:lstStyle/>
+              <a:p>
+                <a:r>
+                  <a:rPr lang="nl-NL" sz="1200" dirty="0" smtClean="0"/>
+                  <a:t>u*</a:t>
+                </a:r>
+                <a:endParaRPr lang="nl-NL" sz="1200" dirty="0"/>
+              </a:p>
+            </p:txBody>
+          </p:sp>
+          <p:sp>
+            <p:nvSpPr>
+              <p:cNvPr id="44" name="Tekstvak 43"/>
+              <p:cNvSpPr txBox="1"/>
+              <p:nvPr/>
+            </p:nvSpPr>
+            <p:spPr>
+              <a:xfrm>
+                <a:off x="6118225" y="3502837"/>
+                <a:ext cx="152400" cy="276999"/>
+              </a:xfrm>
+              <a:prstGeom prst="rect">
+                <a:avLst/>
+              </a:prstGeom>
+              <a:noFill/>
+            </p:spPr>
+            <p:txBody>
+              <a:bodyPr wrap="square" rtlCol="0">
+                <a:spAutoFit/>
+              </a:bodyPr>
+              <a:lstStyle/>
+              <a:p>
+                <a:r>
+                  <a:rPr lang="nl-NL" sz="1200" dirty="0"/>
+                  <a:t>U</a:t>
+                </a:r>
+                <a:r>
+                  <a:rPr lang="nl-NL" sz="1200" dirty="0" smtClean="0"/>
+                  <a:t>(s)</a:t>
+                </a:r>
+                <a:endParaRPr lang="nl-NL" sz="1200" dirty="0"/>
+              </a:p>
+            </p:txBody>
+          </p:sp>
+          <p:sp>
+            <p:nvSpPr>
+              <p:cNvPr id="45" name="Tekstvak 44"/>
+              <p:cNvSpPr txBox="1"/>
+              <p:nvPr/>
+            </p:nvSpPr>
+            <p:spPr>
+              <a:xfrm>
+                <a:off x="7013575" y="3502837"/>
+                <a:ext cx="152400" cy="276999"/>
+              </a:xfrm>
+              <a:prstGeom prst="rect">
+                <a:avLst/>
+              </a:prstGeom>
+              <a:noFill/>
+            </p:spPr>
+            <p:txBody>
+              <a:bodyPr wrap="square" rtlCol="0">
+                <a:spAutoFit/>
+              </a:bodyPr>
+              <a:lstStyle/>
+              <a:p>
+                <a:r>
+                  <a:rPr lang="nl-NL" sz="1200" dirty="0"/>
+                  <a:t>U</a:t>
+                </a:r>
+                <a:r>
+                  <a:rPr lang="nl-NL" sz="1200" dirty="0" smtClean="0"/>
+                  <a:t>*(s)</a:t>
+                </a:r>
+                <a:endParaRPr lang="nl-NL" sz="1200" dirty="0"/>
+              </a:p>
+            </p:txBody>
+          </p:sp>
         </p:grpSp>
         <p:sp>
           <p:nvSpPr>
-            <p:cNvPr id="32" name="Tekstvak 31"/>
+            <p:cNvPr id="47" name="Tekstvak 46"/>
             <p:cNvSpPr txBox="1"/>
             <p:nvPr/>
           </p:nvSpPr>
           <p:spPr>
             <a:xfrm>
-              <a:off x="1892300" y="3121837"/>
-              <a:ext cx="152400" cy="276999"/>
-            </a:xfrm>
-            <a:prstGeom prst="rect">
-              <a:avLst/>
-            </a:prstGeom>
-            <a:noFill/>
-          </p:spPr>
-          <p:txBody>
-            <a:bodyPr wrap="square" rtlCol="0">
-              <a:spAutoFit/>
-            </a:bodyPr>
-            <a:lstStyle/>
-            <a:p>
-              <a:r>
-                <a:rPr lang="nl-NL" sz="1200" dirty="0"/>
-                <a:t>r</a:t>
-              </a:r>
-            </a:p>
-          </p:txBody>
-        </p:sp>
-        <p:sp>
-          <p:nvSpPr>
-            <p:cNvPr id="33" name="Tekstvak 32"/>
-            <p:cNvSpPr txBox="1"/>
-            <p:nvPr/>
-          </p:nvSpPr>
-          <p:spPr>
-            <a:xfrm>
-              <a:off x="2844800" y="3121837"/>
-              <a:ext cx="152400" cy="276999"/>
-            </a:xfrm>
-            <a:prstGeom prst="rect">
-              <a:avLst/>
-            </a:prstGeom>
-            <a:noFill/>
-          </p:spPr>
-          <p:txBody>
-            <a:bodyPr wrap="square" rtlCol="0">
-              <a:spAutoFit/>
-            </a:bodyPr>
-            <a:lstStyle/>
-            <a:p>
-              <a:r>
-                <a:rPr lang="nl-NL" sz="1200" dirty="0"/>
-                <a:t>r</a:t>
-              </a:r>
-              <a:r>
-                <a:rPr lang="nl-NL" sz="1200" dirty="0" smtClean="0"/>
-                <a:t>*</a:t>
-              </a:r>
-              <a:endParaRPr lang="nl-NL" sz="1200" dirty="0"/>
-            </a:p>
-          </p:txBody>
-        </p:sp>
-        <p:sp>
-          <p:nvSpPr>
-            <p:cNvPr id="34" name="Tekstvak 33"/>
-            <p:cNvSpPr txBox="1"/>
-            <p:nvPr/>
-          </p:nvSpPr>
-          <p:spPr>
-            <a:xfrm>
-              <a:off x="1892300" y="3502837"/>
-              <a:ext cx="152400" cy="276999"/>
-            </a:xfrm>
-            <a:prstGeom prst="rect">
-              <a:avLst/>
-            </a:prstGeom>
-            <a:noFill/>
-          </p:spPr>
-          <p:txBody>
-            <a:bodyPr wrap="square" rtlCol="0">
-              <a:spAutoFit/>
-            </a:bodyPr>
-            <a:lstStyle/>
-            <a:p>
-              <a:r>
-                <a:rPr lang="nl-NL" sz="1200" dirty="0" smtClean="0"/>
-                <a:t>R(s)</a:t>
-              </a:r>
-              <a:endParaRPr lang="nl-NL" sz="1200" dirty="0"/>
-            </a:p>
-          </p:txBody>
-        </p:sp>
-        <p:sp>
-          <p:nvSpPr>
-            <p:cNvPr id="35" name="Tekstvak 34"/>
-            <p:cNvSpPr txBox="1"/>
-            <p:nvPr/>
-          </p:nvSpPr>
-          <p:spPr>
-            <a:xfrm>
-              <a:off x="2844800" y="3502837"/>
-              <a:ext cx="152400" cy="276999"/>
-            </a:xfrm>
-            <a:prstGeom prst="rect">
-              <a:avLst/>
-            </a:prstGeom>
-            <a:noFill/>
-          </p:spPr>
-          <p:txBody>
-            <a:bodyPr wrap="square" rtlCol="0">
-              <a:spAutoFit/>
-            </a:bodyPr>
-            <a:lstStyle/>
-            <a:p>
-              <a:r>
-                <a:rPr lang="nl-NL" sz="1200" dirty="0" smtClean="0"/>
-                <a:t>R*(s)</a:t>
-              </a:r>
-              <a:endParaRPr lang="nl-NL" sz="1200" dirty="0"/>
-            </a:p>
-          </p:txBody>
-        </p:sp>
-        <p:sp>
-          <p:nvSpPr>
-            <p:cNvPr id="36" name="Tekstvak 35"/>
-            <p:cNvSpPr txBox="1"/>
-            <p:nvPr/>
-          </p:nvSpPr>
-          <p:spPr>
-            <a:xfrm>
-              <a:off x="2517775" y="3310751"/>
+              <a:off x="6651625" y="3310751"/>
               <a:ext cx="152400" cy="276999"/>
             </a:xfrm>
             <a:prstGeom prst="rect">
@@ -3764,291 +4098,6 @@
                 <a:t>s</a:t>
               </a:r>
               <a:endParaRPr lang="nl-NL" sz="1200" baseline="-25000" dirty="0"/>
-            </a:p>
-          </p:txBody>
-        </p:sp>
-        <p:sp>
-          <p:nvSpPr>
-            <p:cNvPr id="37" name="Tekstvak 36"/>
-            <p:cNvSpPr txBox="1"/>
-            <p:nvPr/>
-          </p:nvSpPr>
-          <p:spPr>
-            <a:xfrm>
-              <a:off x="4038600" y="3121837"/>
-              <a:ext cx="152400" cy="276999"/>
-            </a:xfrm>
-            <a:prstGeom prst="rect">
-              <a:avLst/>
-            </a:prstGeom>
-            <a:noFill/>
-          </p:spPr>
-          <p:txBody>
-            <a:bodyPr wrap="square" rtlCol="0">
-              <a:spAutoFit/>
-            </a:bodyPr>
-            <a:lstStyle/>
-            <a:p>
-              <a:r>
-                <a:rPr lang="nl-NL" sz="1200" dirty="0" smtClean="0"/>
-                <a:t>e</a:t>
-              </a:r>
-              <a:endParaRPr lang="nl-NL" sz="1200" dirty="0"/>
-            </a:p>
-          </p:txBody>
-        </p:sp>
-        <p:sp>
-          <p:nvSpPr>
-            <p:cNvPr id="38" name="Tekstvak 37"/>
-            <p:cNvSpPr txBox="1"/>
-            <p:nvPr/>
-          </p:nvSpPr>
-          <p:spPr>
-            <a:xfrm>
-              <a:off x="4930775" y="3121837"/>
-              <a:ext cx="152400" cy="276999"/>
-            </a:xfrm>
-            <a:prstGeom prst="rect">
-              <a:avLst/>
-            </a:prstGeom>
-            <a:noFill/>
-          </p:spPr>
-          <p:txBody>
-            <a:bodyPr wrap="square" rtlCol="0">
-              <a:spAutoFit/>
-            </a:bodyPr>
-            <a:lstStyle/>
-            <a:p>
-              <a:r>
-                <a:rPr lang="nl-NL" sz="1200" dirty="0" smtClean="0"/>
-                <a:t>e*</a:t>
-              </a:r>
-              <a:endParaRPr lang="nl-NL" sz="1200" dirty="0"/>
-            </a:p>
-          </p:txBody>
-        </p:sp>
-        <p:sp>
-          <p:nvSpPr>
-            <p:cNvPr id="39" name="Tekstvak 38"/>
-            <p:cNvSpPr txBox="1"/>
-            <p:nvPr/>
-          </p:nvSpPr>
-          <p:spPr>
-            <a:xfrm>
-              <a:off x="4038600" y="3502837"/>
-              <a:ext cx="152400" cy="276999"/>
-            </a:xfrm>
-            <a:prstGeom prst="rect">
-              <a:avLst/>
-            </a:prstGeom>
-            <a:noFill/>
-          </p:spPr>
-          <p:txBody>
-            <a:bodyPr wrap="square" rtlCol="0">
-              <a:spAutoFit/>
-            </a:bodyPr>
-            <a:lstStyle/>
-            <a:p>
-              <a:r>
-                <a:rPr lang="nl-NL" sz="1200" dirty="0" smtClean="0"/>
-                <a:t>E(s)</a:t>
-              </a:r>
-              <a:endParaRPr lang="nl-NL" sz="1200" dirty="0"/>
-            </a:p>
-          </p:txBody>
-        </p:sp>
-        <p:sp>
-          <p:nvSpPr>
-            <p:cNvPr id="40" name="Tekstvak 39"/>
-            <p:cNvSpPr txBox="1"/>
-            <p:nvPr/>
-          </p:nvSpPr>
-          <p:spPr>
-            <a:xfrm>
-              <a:off x="4930775" y="3502837"/>
-              <a:ext cx="152400" cy="276999"/>
-            </a:xfrm>
-            <a:prstGeom prst="rect">
-              <a:avLst/>
-            </a:prstGeom>
-            <a:noFill/>
-          </p:spPr>
-          <p:txBody>
-            <a:bodyPr wrap="square" rtlCol="0">
-              <a:spAutoFit/>
-            </a:bodyPr>
-            <a:lstStyle/>
-            <a:p>
-              <a:r>
-                <a:rPr lang="nl-NL" sz="1200" dirty="0"/>
-                <a:t>E</a:t>
-              </a:r>
-              <a:r>
-                <a:rPr lang="nl-NL" sz="1200" dirty="0" smtClean="0"/>
-                <a:t>*(s)</a:t>
-              </a:r>
-              <a:endParaRPr lang="nl-NL" sz="1200" dirty="0"/>
-            </a:p>
-          </p:txBody>
-        </p:sp>
-        <p:sp>
-          <p:nvSpPr>
-            <p:cNvPr id="41" name="Tekstvak 40"/>
-            <p:cNvSpPr txBox="1"/>
-            <p:nvPr/>
-          </p:nvSpPr>
-          <p:spPr>
-            <a:xfrm>
-              <a:off x="4594225" y="3310751"/>
-              <a:ext cx="152400" cy="276999"/>
-            </a:xfrm>
-            <a:prstGeom prst="rect">
-              <a:avLst/>
-            </a:prstGeom>
-            <a:noFill/>
-          </p:spPr>
-          <p:txBody>
-            <a:bodyPr wrap="square" rtlCol="0">
-              <a:spAutoFit/>
-            </a:bodyPr>
-            <a:lstStyle/>
-            <a:p>
-              <a:r>
-                <a:rPr lang="nl-NL" sz="1200" dirty="0" smtClean="0"/>
-                <a:t>T</a:t>
-              </a:r>
-              <a:r>
-                <a:rPr lang="nl-NL" sz="1200" baseline="-25000" dirty="0" smtClean="0"/>
-                <a:t>s</a:t>
-              </a:r>
-              <a:endParaRPr lang="nl-NL" sz="1200" baseline="-25000" dirty="0"/>
-            </a:p>
-          </p:txBody>
-        </p:sp>
-        <p:sp>
-          <p:nvSpPr>
-            <p:cNvPr id="42" name="Tekstvak 41"/>
-            <p:cNvSpPr txBox="1"/>
-            <p:nvPr/>
-          </p:nvSpPr>
-          <p:spPr>
-            <a:xfrm>
-              <a:off x="6118225" y="3121837"/>
-              <a:ext cx="152400" cy="276999"/>
-            </a:xfrm>
-            <a:prstGeom prst="rect">
-              <a:avLst/>
-            </a:prstGeom>
-            <a:noFill/>
-          </p:spPr>
-          <p:txBody>
-            <a:bodyPr wrap="square" rtlCol="0">
-              <a:spAutoFit/>
-            </a:bodyPr>
-            <a:lstStyle/>
-            <a:p>
-              <a:r>
-                <a:rPr lang="nl-NL" sz="1200" dirty="0"/>
-                <a:t>u</a:t>
-              </a:r>
-            </a:p>
-          </p:txBody>
-        </p:sp>
-        <p:sp>
-          <p:nvSpPr>
-            <p:cNvPr id="43" name="Tekstvak 42"/>
-            <p:cNvSpPr txBox="1"/>
-            <p:nvPr/>
-          </p:nvSpPr>
-          <p:spPr>
-            <a:xfrm>
-              <a:off x="7013575" y="3121837"/>
-              <a:ext cx="152400" cy="276999"/>
-            </a:xfrm>
-            <a:prstGeom prst="rect">
-              <a:avLst/>
-            </a:prstGeom>
-            <a:noFill/>
-          </p:spPr>
-          <p:txBody>
-            <a:bodyPr wrap="square" rtlCol="0">
-              <a:spAutoFit/>
-            </a:bodyPr>
-            <a:lstStyle/>
-            <a:p>
-              <a:r>
-                <a:rPr lang="nl-NL" sz="1200" dirty="0" smtClean="0"/>
-                <a:t>u*</a:t>
-              </a:r>
-              <a:endParaRPr lang="nl-NL" sz="1200" dirty="0"/>
-            </a:p>
-          </p:txBody>
-        </p:sp>
-        <p:sp>
-          <p:nvSpPr>
-            <p:cNvPr id="44" name="Tekstvak 43"/>
-            <p:cNvSpPr txBox="1"/>
-            <p:nvPr/>
-          </p:nvSpPr>
-          <p:spPr>
-            <a:xfrm>
-              <a:off x="6118225" y="3502837"/>
-              <a:ext cx="152400" cy="276999"/>
-            </a:xfrm>
-            <a:prstGeom prst="rect">
-              <a:avLst/>
-            </a:prstGeom>
-            <a:noFill/>
-          </p:spPr>
-          <p:txBody>
-            <a:bodyPr wrap="square" rtlCol="0">
-              <a:spAutoFit/>
-            </a:bodyPr>
-            <a:lstStyle/>
-            <a:p>
-              <a:r>
-                <a:rPr lang="nl-NL" sz="1200" dirty="0"/>
-                <a:t>U</a:t>
-              </a:r>
-              <a:r>
-                <a:rPr lang="nl-NL" sz="1200" dirty="0" smtClean="0"/>
-                <a:t>(s)</a:t>
-              </a:r>
-              <a:endParaRPr lang="nl-NL" sz="1200" dirty="0"/>
-            </a:p>
-          </p:txBody>
-        </p:sp>
-        <p:sp>
-          <p:nvSpPr>
-            <p:cNvPr id="45" name="Tekstvak 44"/>
-            <p:cNvSpPr txBox="1"/>
-            <p:nvPr/>
-          </p:nvSpPr>
-          <p:spPr>
-            <a:xfrm>
-              <a:off x="7013575" y="3502837"/>
-              <a:ext cx="152400" cy="276999"/>
-            </a:xfrm>
-            <a:prstGeom prst="rect">
-              <a:avLst/>
-            </a:prstGeom>
-            <a:noFill/>
-          </p:spPr>
-          <p:txBody>
-            <a:bodyPr wrap="square" rtlCol="0">
-              <a:spAutoFit/>
-            </a:bodyPr>
-            <a:lstStyle/>
-            <a:p>
-              <a:r>
-                <a:rPr lang="nl-NL" sz="1200" dirty="0"/>
-                <a:t>U</a:t>
-              </a:r>
-              <a:r>
-                <a:rPr lang="nl-NL" sz="1200" dirty="0" smtClean="0"/>
-                <a:t>*(s)</a:t>
-              </a:r>
-              <a:endParaRPr lang="nl-NL" sz="1200" dirty="0"/>
             </a:p>
           </p:txBody>
         </p:sp>

</xml_diff>